<commit_message>
cahier technique + devis
</commit_message>
<xml_diff>
--- a/Présentation projet 3 - AImé - Charley - Emmanuel - Nassim.pptx
+++ b/Présentation projet 3 - AImé - Charley - Emmanuel - Nassim.pptx
@@ -17700,6 +17700,135 @@
           </a:p>
         </p:txBody>
       </p:sp>
+      <p:sp>
+        <p:nvSpPr>
+          <p:cNvPr id="4" name="Espace réservé du pied de page 4">
+            <a:extLst>
+              <a:ext uri="{FF2B5EF4-FFF2-40B4-BE49-F238E27FC236}">
+                <a16:creationId xmlns:a16="http://schemas.microsoft.com/office/drawing/2014/main" id="{A4732BB0-E872-5DB6-0952-389A3ED33656}"/>
+              </a:ext>
+            </a:extLst>
+          </p:cNvPr>
+          <p:cNvSpPr txBox="1">
+            <a:spLocks/>
+          </p:cNvSpPr>
+          <p:nvPr/>
+        </p:nvSpPr>
+        <p:spPr>
+          <a:xfrm>
+            <a:off x="516621" y="6413448"/>
+            <a:ext cx="1095869" cy="250928"/>
+          </a:xfrm>
+          <a:prstGeom prst="rect">
+            <a:avLst/>
+          </a:prstGeom>
+        </p:spPr>
+        <p:txBody>
+          <a:bodyPr rtlCol="0"/>
+          <a:lstStyle>
+            <a:defPPr rtl="0">
+              <a:defRPr lang="fr-FR"/>
+            </a:defPPr>
+            <a:lvl1pPr marL="0" algn="l" defTabSz="914400" rtl="0" eaLnBrk="1" latinLnBrk="0" hangingPunct="1">
+              <a:defRPr sz="1800" kern="1200">
+                <a:solidFill>
+                  <a:schemeClr val="tx1"/>
+                </a:solidFill>
+                <a:latin typeface="+mn-lt"/>
+                <a:ea typeface="+mn-ea"/>
+                <a:cs typeface="+mn-cs"/>
+              </a:defRPr>
+            </a:lvl1pPr>
+            <a:lvl2pPr marL="457200" algn="l" defTabSz="914400" rtl="0" eaLnBrk="1" latinLnBrk="0" hangingPunct="1">
+              <a:defRPr sz="1800" kern="1200">
+                <a:solidFill>
+                  <a:schemeClr val="tx1"/>
+                </a:solidFill>
+                <a:latin typeface="+mn-lt"/>
+                <a:ea typeface="+mn-ea"/>
+                <a:cs typeface="+mn-cs"/>
+              </a:defRPr>
+            </a:lvl2pPr>
+            <a:lvl3pPr marL="914400" algn="l" defTabSz="914400" rtl="0" eaLnBrk="1" latinLnBrk="0" hangingPunct="1">
+              <a:defRPr sz="1800" kern="1200">
+                <a:solidFill>
+                  <a:schemeClr val="tx1"/>
+                </a:solidFill>
+                <a:latin typeface="+mn-lt"/>
+                <a:ea typeface="+mn-ea"/>
+                <a:cs typeface="+mn-cs"/>
+              </a:defRPr>
+            </a:lvl3pPr>
+            <a:lvl4pPr marL="1371600" algn="l" defTabSz="914400" rtl="0" eaLnBrk="1" latinLnBrk="0" hangingPunct="1">
+              <a:defRPr sz="1800" kern="1200">
+                <a:solidFill>
+                  <a:schemeClr val="tx1"/>
+                </a:solidFill>
+                <a:latin typeface="+mn-lt"/>
+                <a:ea typeface="+mn-ea"/>
+                <a:cs typeface="+mn-cs"/>
+              </a:defRPr>
+            </a:lvl4pPr>
+            <a:lvl5pPr marL="1828800" algn="l" defTabSz="914400" rtl="0" eaLnBrk="1" latinLnBrk="0" hangingPunct="1">
+              <a:defRPr sz="1800" kern="1200">
+                <a:solidFill>
+                  <a:schemeClr val="tx1"/>
+                </a:solidFill>
+                <a:latin typeface="+mn-lt"/>
+                <a:ea typeface="+mn-ea"/>
+                <a:cs typeface="+mn-cs"/>
+              </a:defRPr>
+            </a:lvl5pPr>
+            <a:lvl6pPr marL="2286000" algn="l" defTabSz="914400" rtl="0" eaLnBrk="1" latinLnBrk="0" hangingPunct="1">
+              <a:defRPr sz="1800" kern="1200">
+                <a:solidFill>
+                  <a:schemeClr val="tx1"/>
+                </a:solidFill>
+                <a:latin typeface="+mn-lt"/>
+                <a:ea typeface="+mn-ea"/>
+                <a:cs typeface="+mn-cs"/>
+              </a:defRPr>
+            </a:lvl6pPr>
+            <a:lvl7pPr marL="2743200" algn="l" defTabSz="914400" rtl="0" eaLnBrk="1" latinLnBrk="0" hangingPunct="1">
+              <a:defRPr sz="1800" kern="1200">
+                <a:solidFill>
+                  <a:schemeClr val="tx1"/>
+                </a:solidFill>
+                <a:latin typeface="+mn-lt"/>
+                <a:ea typeface="+mn-ea"/>
+                <a:cs typeface="+mn-cs"/>
+              </a:defRPr>
+            </a:lvl7pPr>
+            <a:lvl8pPr marL="3200400" algn="l" defTabSz="914400" rtl="0" eaLnBrk="1" latinLnBrk="0" hangingPunct="1">
+              <a:defRPr sz="1800" kern="1200">
+                <a:solidFill>
+                  <a:schemeClr val="tx1"/>
+                </a:solidFill>
+                <a:latin typeface="+mn-lt"/>
+                <a:ea typeface="+mn-ea"/>
+                <a:cs typeface="+mn-cs"/>
+              </a:defRPr>
+            </a:lvl8pPr>
+            <a:lvl9pPr marL="3657600" algn="l" defTabSz="914400" rtl="0" eaLnBrk="1" latinLnBrk="0" hangingPunct="1">
+              <a:defRPr sz="1800" kern="1200">
+                <a:solidFill>
+                  <a:schemeClr val="tx1"/>
+                </a:solidFill>
+                <a:latin typeface="+mn-lt"/>
+                <a:ea typeface="+mn-ea"/>
+                <a:cs typeface="+mn-cs"/>
+              </a:defRPr>
+            </a:lvl9pPr>
+          </a:lstStyle>
+          <a:p>
+            <a:r>
+              <a:rPr lang="fr-FR" sz="900"/>
+              <a:t>Octopus</a:t>
+            </a:r>
+            <a:endParaRPr lang="fr-FR" sz="900" dirty="0"/>
+          </a:p>
+        </p:txBody>
+      </p:sp>
     </p:spTree>
     <p:extLst>
       <p:ext uri="{BB962C8B-B14F-4D97-AF65-F5344CB8AC3E}">
@@ -17943,40 +18072,6 @@
       </p:sp>
       <p:sp>
         <p:nvSpPr>
-          <p:cNvPr id="20" name="Espace réservé de la date 19">
-            <a:extLst>
-              <a:ext uri="{FF2B5EF4-FFF2-40B4-BE49-F238E27FC236}">
-                <a16:creationId xmlns:a16="http://schemas.microsoft.com/office/drawing/2014/main" id="{A74D661B-510C-4CF2-BF77-3EAFB649883D}"/>
-              </a:ext>
-            </a:extLst>
-          </p:cNvPr>
-          <p:cNvSpPr>
-            <a:spLocks noGrp="1"/>
-          </p:cNvSpPr>
-          <p:nvPr>
-            <p:ph type="dt" sz="half" idx="20"/>
-          </p:nvPr>
-        </p:nvSpPr>
-        <p:spPr>
-          <a:xfrm>
-            <a:off x="5919680" y="6356350"/>
-            <a:ext cx="947516" cy="365125"/>
-          </a:xfrm>
-        </p:spPr>
-        <p:txBody>
-          <a:bodyPr rtlCol="0"/>
-          <a:lstStyle/>
-          <a:p>
-            <a:pPr rtl="0"/>
-            <a:r>
-              <a:rPr lang="fr-FR" dirty="0"/>
-              <a:t>2025</a:t>
-            </a:r>
-          </a:p>
-        </p:txBody>
-      </p:sp>
-      <p:sp>
-        <p:nvSpPr>
           <p:cNvPr id="22" name="Espace réservé du numéro de diapositive 21">
             <a:extLst>
               <a:ext uri="{FF2B5EF4-FFF2-40B4-BE49-F238E27FC236}">
@@ -18086,6 +18181,135 @@
           </a:p>
           <a:p>
             <a:endParaRPr lang="fr-FR" sz="1600" dirty="0"/>
+          </a:p>
+        </p:txBody>
+      </p:sp>
+      <p:sp>
+        <p:nvSpPr>
+          <p:cNvPr id="4" name="Espace réservé du pied de page 4">
+            <a:extLst>
+              <a:ext uri="{FF2B5EF4-FFF2-40B4-BE49-F238E27FC236}">
+                <a16:creationId xmlns:a16="http://schemas.microsoft.com/office/drawing/2014/main" id="{6BB55573-060D-03E8-4777-69409711D267}"/>
+              </a:ext>
+            </a:extLst>
+          </p:cNvPr>
+          <p:cNvSpPr txBox="1">
+            <a:spLocks/>
+          </p:cNvSpPr>
+          <p:nvPr/>
+        </p:nvSpPr>
+        <p:spPr>
+          <a:xfrm>
+            <a:off x="516621" y="6413448"/>
+            <a:ext cx="1095869" cy="250928"/>
+          </a:xfrm>
+          <a:prstGeom prst="rect">
+            <a:avLst/>
+          </a:prstGeom>
+        </p:spPr>
+        <p:txBody>
+          <a:bodyPr rtlCol="0"/>
+          <a:lstStyle>
+            <a:defPPr rtl="0">
+              <a:defRPr lang="fr-FR"/>
+            </a:defPPr>
+            <a:lvl1pPr marL="0" algn="l" defTabSz="914400" rtl="0" eaLnBrk="1" latinLnBrk="0" hangingPunct="1">
+              <a:defRPr sz="1800" kern="1200">
+                <a:solidFill>
+                  <a:schemeClr val="tx1"/>
+                </a:solidFill>
+                <a:latin typeface="+mn-lt"/>
+                <a:ea typeface="+mn-ea"/>
+                <a:cs typeface="+mn-cs"/>
+              </a:defRPr>
+            </a:lvl1pPr>
+            <a:lvl2pPr marL="457200" algn="l" defTabSz="914400" rtl="0" eaLnBrk="1" latinLnBrk="0" hangingPunct="1">
+              <a:defRPr sz="1800" kern="1200">
+                <a:solidFill>
+                  <a:schemeClr val="tx1"/>
+                </a:solidFill>
+                <a:latin typeface="+mn-lt"/>
+                <a:ea typeface="+mn-ea"/>
+                <a:cs typeface="+mn-cs"/>
+              </a:defRPr>
+            </a:lvl2pPr>
+            <a:lvl3pPr marL="914400" algn="l" defTabSz="914400" rtl="0" eaLnBrk="1" latinLnBrk="0" hangingPunct="1">
+              <a:defRPr sz="1800" kern="1200">
+                <a:solidFill>
+                  <a:schemeClr val="tx1"/>
+                </a:solidFill>
+                <a:latin typeface="+mn-lt"/>
+                <a:ea typeface="+mn-ea"/>
+                <a:cs typeface="+mn-cs"/>
+              </a:defRPr>
+            </a:lvl3pPr>
+            <a:lvl4pPr marL="1371600" algn="l" defTabSz="914400" rtl="0" eaLnBrk="1" latinLnBrk="0" hangingPunct="1">
+              <a:defRPr sz="1800" kern="1200">
+                <a:solidFill>
+                  <a:schemeClr val="tx1"/>
+                </a:solidFill>
+                <a:latin typeface="+mn-lt"/>
+                <a:ea typeface="+mn-ea"/>
+                <a:cs typeface="+mn-cs"/>
+              </a:defRPr>
+            </a:lvl4pPr>
+            <a:lvl5pPr marL="1828800" algn="l" defTabSz="914400" rtl="0" eaLnBrk="1" latinLnBrk="0" hangingPunct="1">
+              <a:defRPr sz="1800" kern="1200">
+                <a:solidFill>
+                  <a:schemeClr val="tx1"/>
+                </a:solidFill>
+                <a:latin typeface="+mn-lt"/>
+                <a:ea typeface="+mn-ea"/>
+                <a:cs typeface="+mn-cs"/>
+              </a:defRPr>
+            </a:lvl5pPr>
+            <a:lvl6pPr marL="2286000" algn="l" defTabSz="914400" rtl="0" eaLnBrk="1" latinLnBrk="0" hangingPunct="1">
+              <a:defRPr sz="1800" kern="1200">
+                <a:solidFill>
+                  <a:schemeClr val="tx1"/>
+                </a:solidFill>
+                <a:latin typeface="+mn-lt"/>
+                <a:ea typeface="+mn-ea"/>
+                <a:cs typeface="+mn-cs"/>
+              </a:defRPr>
+            </a:lvl6pPr>
+            <a:lvl7pPr marL="2743200" algn="l" defTabSz="914400" rtl="0" eaLnBrk="1" latinLnBrk="0" hangingPunct="1">
+              <a:defRPr sz="1800" kern="1200">
+                <a:solidFill>
+                  <a:schemeClr val="tx1"/>
+                </a:solidFill>
+                <a:latin typeface="+mn-lt"/>
+                <a:ea typeface="+mn-ea"/>
+                <a:cs typeface="+mn-cs"/>
+              </a:defRPr>
+            </a:lvl7pPr>
+            <a:lvl8pPr marL="3200400" algn="l" defTabSz="914400" rtl="0" eaLnBrk="1" latinLnBrk="0" hangingPunct="1">
+              <a:defRPr sz="1800" kern="1200">
+                <a:solidFill>
+                  <a:schemeClr val="tx1"/>
+                </a:solidFill>
+                <a:latin typeface="+mn-lt"/>
+                <a:ea typeface="+mn-ea"/>
+                <a:cs typeface="+mn-cs"/>
+              </a:defRPr>
+            </a:lvl8pPr>
+            <a:lvl9pPr marL="3657600" algn="l" defTabSz="914400" rtl="0" eaLnBrk="1" latinLnBrk="0" hangingPunct="1">
+              <a:defRPr sz="1800" kern="1200">
+                <a:solidFill>
+                  <a:schemeClr val="tx1"/>
+                </a:solidFill>
+                <a:latin typeface="+mn-lt"/>
+                <a:ea typeface="+mn-ea"/>
+                <a:cs typeface="+mn-cs"/>
+              </a:defRPr>
+            </a:lvl9pPr>
+          </a:lstStyle>
+          <a:p>
+            <a:r>
+              <a:rPr lang="fr-FR" sz="900"/>
+              <a:t>Octopus</a:t>
+            </a:r>
+            <a:endParaRPr lang="fr-FR" sz="900" dirty="0"/>
           </a:p>
         </p:txBody>
       </p:sp>
@@ -18189,64 +18413,6 @@
       </p:sp>
       <p:sp>
         <p:nvSpPr>
-          <p:cNvPr id="9" name="Espace réservé de la date 8">
-            <a:extLst>
-              <a:ext uri="{FF2B5EF4-FFF2-40B4-BE49-F238E27FC236}">
-                <a16:creationId xmlns:a16="http://schemas.microsoft.com/office/drawing/2014/main" id="{FAF2A1C2-7E45-B59C-5473-3F008FBDAA4D}"/>
-              </a:ext>
-            </a:extLst>
-          </p:cNvPr>
-          <p:cNvSpPr>
-            <a:spLocks noGrp="1"/>
-          </p:cNvSpPr>
-          <p:nvPr>
-            <p:ph type="dt" sz="half" idx="10"/>
-          </p:nvPr>
-        </p:nvSpPr>
-        <p:spPr/>
-        <p:txBody>
-          <a:bodyPr/>
-          <a:lstStyle/>
-          <a:p>
-            <a:pPr rtl="0"/>
-            <a:r>
-              <a:rPr lang="fr-FR" noProof="0" dirty="0"/>
-              <a:t>2025</a:t>
-            </a:r>
-          </a:p>
-        </p:txBody>
-      </p:sp>
-      <p:sp>
-        <p:nvSpPr>
-          <p:cNvPr id="10" name="Espace réservé du pied de page 9">
-            <a:extLst>
-              <a:ext uri="{FF2B5EF4-FFF2-40B4-BE49-F238E27FC236}">
-                <a16:creationId xmlns:a16="http://schemas.microsoft.com/office/drawing/2014/main" id="{C0C00B37-F0E8-A74F-2589-01BA6B01B2FB}"/>
-              </a:ext>
-            </a:extLst>
-          </p:cNvPr>
-          <p:cNvSpPr>
-            <a:spLocks noGrp="1"/>
-          </p:cNvSpPr>
-          <p:nvPr>
-            <p:ph type="ftr" sz="quarter" idx="11"/>
-          </p:nvPr>
-        </p:nvSpPr>
-        <p:spPr/>
-        <p:txBody>
-          <a:bodyPr/>
-          <a:lstStyle/>
-          <a:p>
-            <a:pPr rtl="0"/>
-            <a:r>
-              <a:rPr lang="fr-FR" noProof="0"/>
-              <a:t>Pitch Deck</a:t>
-            </a:r>
-          </a:p>
-        </p:txBody>
-      </p:sp>
-      <p:sp>
-        <p:nvSpPr>
           <p:cNvPr id="11" name="Espace réservé du numéro de diapositive 10">
             <a:extLst>
               <a:ext uri="{FF2B5EF4-FFF2-40B4-BE49-F238E27FC236}">
@@ -18277,10 +18443,10 @@
       </p:sp>
       <p:pic>
         <p:nvPicPr>
-          <p:cNvPr id="5" name="Image 4" descr="Une image contenant diagramme, capture d’écran&#10;&#10;Le contenu généré par l’IA peut être incorrect.">
-            <a:extLst>
-              <a:ext uri="{FF2B5EF4-FFF2-40B4-BE49-F238E27FC236}">
-                <a16:creationId xmlns:a16="http://schemas.microsoft.com/office/drawing/2014/main" id="{0C02ED93-4F9F-6AE3-98F8-D0D67D8B2D77}"/>
+          <p:cNvPr id="6" name="Image 5" descr="Une image contenant capture d’écran, texte, diagramme, conception&#10;&#10;Le contenu généré par l’IA peut être incorrect.">
+            <a:extLst>
+              <a:ext uri="{FF2B5EF4-FFF2-40B4-BE49-F238E27FC236}">
+                <a16:creationId xmlns:a16="http://schemas.microsoft.com/office/drawing/2014/main" id="{901A39E2-7856-E90F-EFDD-B48133D3146F}"/>
               </a:ext>
             </a:extLst>
           </p:cNvPr>
@@ -18297,14 +18463,48 @@
         </p:blipFill>
         <p:spPr>
           <a:xfrm>
-            <a:off x="974129" y="1065542"/>
-            <a:ext cx="10243741" cy="4726916"/>
+            <a:off x="587824" y="1164008"/>
+            <a:ext cx="11078800" cy="5114335"/>
           </a:xfrm>
           <a:prstGeom prst="rect">
             <a:avLst/>
           </a:prstGeom>
         </p:spPr>
       </p:pic>
+      <p:sp>
+        <p:nvSpPr>
+          <p:cNvPr id="8" name="Espace réservé du pied de page 4">
+            <a:extLst>
+              <a:ext uri="{FF2B5EF4-FFF2-40B4-BE49-F238E27FC236}">
+                <a16:creationId xmlns:a16="http://schemas.microsoft.com/office/drawing/2014/main" id="{40C4B761-321E-6EFC-9616-DA9911DD4002}"/>
+              </a:ext>
+            </a:extLst>
+          </p:cNvPr>
+          <p:cNvSpPr>
+            <a:spLocks noGrp="1"/>
+          </p:cNvSpPr>
+          <p:nvPr>
+            <p:ph type="ftr" sz="quarter" idx="11"/>
+          </p:nvPr>
+        </p:nvSpPr>
+        <p:spPr>
+          <a:xfrm>
+            <a:off x="516621" y="6413448"/>
+            <a:ext cx="1095869" cy="250928"/>
+          </a:xfrm>
+        </p:spPr>
+        <p:txBody>
+          <a:bodyPr rtlCol="0"/>
+          <a:lstStyle/>
+          <a:p>
+            <a:pPr rtl="0"/>
+            <a:r>
+              <a:rPr lang="fr-FR" dirty="0"/>
+              <a:t>Octopus</a:t>
+            </a:r>
+          </a:p>
+        </p:txBody>
+      </p:sp>
     </p:spTree>
     <p:extLst>
       <p:ext uri="{BB962C8B-B14F-4D97-AF65-F5344CB8AC3E}">
@@ -18416,64 +18616,6 @@
       </p:sp>
       <p:sp>
         <p:nvSpPr>
-          <p:cNvPr id="9" name="Espace réservé de la date 8">
-            <a:extLst>
-              <a:ext uri="{FF2B5EF4-FFF2-40B4-BE49-F238E27FC236}">
-                <a16:creationId xmlns:a16="http://schemas.microsoft.com/office/drawing/2014/main" id="{C7F3C172-C82E-3D35-CDF8-71BA3BB05BCF}"/>
-              </a:ext>
-            </a:extLst>
-          </p:cNvPr>
-          <p:cNvSpPr>
-            <a:spLocks noGrp="1"/>
-          </p:cNvSpPr>
-          <p:nvPr>
-            <p:ph type="dt" sz="half" idx="10"/>
-          </p:nvPr>
-        </p:nvSpPr>
-        <p:spPr/>
-        <p:txBody>
-          <a:bodyPr/>
-          <a:lstStyle/>
-          <a:p>
-            <a:pPr rtl="0"/>
-            <a:r>
-              <a:rPr lang="fr-FR" noProof="0"/>
-              <a:t>20XX</a:t>
-            </a:r>
-          </a:p>
-        </p:txBody>
-      </p:sp>
-      <p:sp>
-        <p:nvSpPr>
-          <p:cNvPr id="10" name="Espace réservé du pied de page 9">
-            <a:extLst>
-              <a:ext uri="{FF2B5EF4-FFF2-40B4-BE49-F238E27FC236}">
-                <a16:creationId xmlns:a16="http://schemas.microsoft.com/office/drawing/2014/main" id="{44D81E86-5D83-2219-98F9-22393A395345}"/>
-              </a:ext>
-            </a:extLst>
-          </p:cNvPr>
-          <p:cNvSpPr>
-            <a:spLocks noGrp="1"/>
-          </p:cNvSpPr>
-          <p:nvPr>
-            <p:ph type="ftr" sz="quarter" idx="11"/>
-          </p:nvPr>
-        </p:nvSpPr>
-        <p:spPr/>
-        <p:txBody>
-          <a:bodyPr/>
-          <a:lstStyle/>
-          <a:p>
-            <a:pPr rtl="0"/>
-            <a:r>
-              <a:rPr lang="fr-FR" noProof="0"/>
-              <a:t>Pitch Deck</a:t>
-            </a:r>
-          </a:p>
-        </p:txBody>
-      </p:sp>
-      <p:sp>
-        <p:nvSpPr>
           <p:cNvPr id="11" name="Espace réservé du numéro de diapositive 10">
             <a:extLst>
               <a:ext uri="{FF2B5EF4-FFF2-40B4-BE49-F238E27FC236}">
@@ -18499,6 +18641,40 @@
               <a:t>5</a:t>
             </a:fld>
             <a:endParaRPr lang="fr-FR" noProof="0"/>
+          </a:p>
+        </p:txBody>
+      </p:sp>
+      <p:sp>
+        <p:nvSpPr>
+          <p:cNvPr id="4" name="Espace réservé du pied de page 4">
+            <a:extLst>
+              <a:ext uri="{FF2B5EF4-FFF2-40B4-BE49-F238E27FC236}">
+                <a16:creationId xmlns:a16="http://schemas.microsoft.com/office/drawing/2014/main" id="{E98AFB16-6FDB-F71F-DEFF-80029A100A29}"/>
+              </a:ext>
+            </a:extLst>
+          </p:cNvPr>
+          <p:cNvSpPr>
+            <a:spLocks noGrp="1"/>
+          </p:cNvSpPr>
+          <p:nvPr>
+            <p:ph type="ftr" sz="quarter" idx="11"/>
+          </p:nvPr>
+        </p:nvSpPr>
+        <p:spPr>
+          <a:xfrm>
+            <a:off x="516621" y="6413448"/>
+            <a:ext cx="1095869" cy="250928"/>
+          </a:xfrm>
+        </p:spPr>
+        <p:txBody>
+          <a:bodyPr rtlCol="0"/>
+          <a:lstStyle/>
+          <a:p>
+            <a:pPr rtl="0"/>
+            <a:r>
+              <a:rPr lang="fr-FR" dirty="0"/>
+              <a:t>Octopus</a:t>
+            </a:r>
           </a:p>
         </p:txBody>
       </p:sp>
@@ -18540,39 +18716,6 @@
       </p:grpSpPr>
       <p:sp>
         <p:nvSpPr>
-          <p:cNvPr id="2" name="Titre 1">
-            <a:extLst>
-              <a:ext uri="{FF2B5EF4-FFF2-40B4-BE49-F238E27FC236}">
-                <a16:creationId xmlns:a16="http://schemas.microsoft.com/office/drawing/2014/main" id="{B76D802F-165E-03DD-1855-BCF13EB6E8AC}"/>
-              </a:ext>
-            </a:extLst>
-          </p:cNvPr>
-          <p:cNvSpPr>
-            <a:spLocks noGrp="1"/>
-          </p:cNvSpPr>
-          <p:nvPr>
-            <p:ph type="title"/>
-          </p:nvPr>
-        </p:nvSpPr>
-        <p:spPr>
-          <a:xfrm>
-            <a:off x="3105407" y="579657"/>
-            <a:ext cx="5431971" cy="846301"/>
-          </a:xfrm>
-        </p:spPr>
-        <p:txBody>
-          <a:bodyPr/>
-          <a:lstStyle/>
-          <a:p>
-            <a:r>
-              <a:rPr lang="fr-FR" dirty="0"/>
-              <a:t>Notre solution</a:t>
-            </a:r>
-          </a:p>
-        </p:txBody>
-      </p:sp>
-      <p:sp>
-        <p:nvSpPr>
           <p:cNvPr id="3" name="Espace réservé du texte 2">
             <a:extLst>
               <a:ext uri="{FF2B5EF4-FFF2-40B4-BE49-F238E27FC236}">
@@ -18602,64 +18745,6 @@
             <a:r>
               <a:rPr lang="fr-FR" dirty="0"/>
               <a:t>Vos contraintes</a:t>
-            </a:r>
-          </a:p>
-        </p:txBody>
-      </p:sp>
-      <p:sp>
-        <p:nvSpPr>
-          <p:cNvPr id="9" name="Espace réservé de la date 8">
-            <a:extLst>
-              <a:ext uri="{FF2B5EF4-FFF2-40B4-BE49-F238E27FC236}">
-                <a16:creationId xmlns:a16="http://schemas.microsoft.com/office/drawing/2014/main" id="{68004676-A976-4C22-4ECA-0E77AA3966EA}"/>
-              </a:ext>
-            </a:extLst>
-          </p:cNvPr>
-          <p:cNvSpPr>
-            <a:spLocks noGrp="1"/>
-          </p:cNvSpPr>
-          <p:nvPr>
-            <p:ph type="dt" sz="half" idx="10"/>
-          </p:nvPr>
-        </p:nvSpPr>
-        <p:spPr/>
-        <p:txBody>
-          <a:bodyPr/>
-          <a:lstStyle/>
-          <a:p>
-            <a:pPr rtl="0"/>
-            <a:r>
-              <a:rPr lang="fr-FR" noProof="0"/>
-              <a:t>20XX</a:t>
-            </a:r>
-          </a:p>
-        </p:txBody>
-      </p:sp>
-      <p:sp>
-        <p:nvSpPr>
-          <p:cNvPr id="10" name="Espace réservé du pied de page 9">
-            <a:extLst>
-              <a:ext uri="{FF2B5EF4-FFF2-40B4-BE49-F238E27FC236}">
-                <a16:creationId xmlns:a16="http://schemas.microsoft.com/office/drawing/2014/main" id="{29A93C12-B192-85D8-FC20-1E5155C7896E}"/>
-              </a:ext>
-            </a:extLst>
-          </p:cNvPr>
-          <p:cNvSpPr>
-            <a:spLocks noGrp="1"/>
-          </p:cNvSpPr>
-          <p:nvPr>
-            <p:ph type="ftr" sz="quarter" idx="11"/>
-          </p:nvPr>
-        </p:nvSpPr>
-        <p:spPr/>
-        <p:txBody>
-          <a:bodyPr/>
-          <a:lstStyle/>
-          <a:p>
-            <a:pPr rtl="0"/>
-            <a:r>
-              <a:rPr lang="fr-FR" noProof="0"/>
-              <a:t>Pitch Deck</a:t>
             </a:r>
           </a:p>
         </p:txBody>
@@ -18696,10 +18781,10 @@
       </p:sp>
       <p:sp>
         <p:nvSpPr>
-          <p:cNvPr id="6" name="Espace réservé du texte 2">
-            <a:extLst>
-              <a:ext uri="{FF2B5EF4-FFF2-40B4-BE49-F238E27FC236}">
-                <a16:creationId xmlns:a16="http://schemas.microsoft.com/office/drawing/2014/main" id="{9434FD74-F3B8-CCC7-4AFD-E014416F7DA3}"/>
+          <p:cNvPr id="8" name="Espace réservé du texte 2">
+            <a:extLst>
+              <a:ext uri="{FF2B5EF4-FFF2-40B4-BE49-F238E27FC236}">
+                <a16:creationId xmlns:a16="http://schemas.microsoft.com/office/drawing/2014/main" id="{1F6E46DD-3AB0-B786-6354-37BA52D7E3A2}"/>
               </a:ext>
             </a:extLst>
           </p:cNvPr>
@@ -18710,8 +18795,8 @@
         </p:nvSpPr>
         <p:spPr>
           <a:xfrm>
-            <a:off x="3836598" y="3882362"/>
-            <a:ext cx="5433204" cy="365125"/>
+            <a:off x="4791638" y="3250724"/>
+            <a:ext cx="3031562" cy="2225516"/>
           </a:xfrm>
           <a:prstGeom prst="rect">
             <a:avLst/>
@@ -18719,7 +18804,7 @@
         </p:spPr>
         <p:txBody>
           <a:bodyPr vert="horz" lIns="91440" tIns="45720" rIns="91440" bIns="45720" rtlCol="0">
-            <a:normAutofit lnSpcReduction="10000"/>
+            <a:normAutofit/>
           </a:bodyPr>
           <a:lstStyle>
             <a:lvl1pPr marL="0" indent="0" algn="l" defTabSz="914400" rtl="0" eaLnBrk="1" latinLnBrk="0" hangingPunct="1">
@@ -18901,20 +18986,80 @@
             </a:lvl9pPr>
           </a:lstStyle>
           <a:p>
-            <a:r>
-              <a:rPr lang="fr-FR" dirty="0" err="1"/>
-              <a:t>fiabilite</a:t>
-            </a:r>
-            <a:endParaRPr lang="fr-FR" dirty="0"/>
-          </a:p>
-        </p:txBody>
-      </p:sp>
-      <p:sp>
-        <p:nvSpPr>
-          <p:cNvPr id="7" name="Espace réservé du texte 2">
-            <a:extLst>
-              <a:ext uri="{FF2B5EF4-FFF2-40B4-BE49-F238E27FC236}">
-                <a16:creationId xmlns:a16="http://schemas.microsoft.com/office/drawing/2014/main" id="{22434D25-BB01-27CA-CABE-61F3FB177CF2}"/>
+            <a:pPr>
+              <a:lnSpc>
+                <a:spcPct val="200000"/>
+              </a:lnSpc>
+            </a:pPr>
+            <a:r>
+              <a:rPr lang="fr-FR" dirty="0"/>
+              <a:t>Interconnexion</a:t>
+            </a:r>
+          </a:p>
+          <a:p>
+            <a:pPr>
+              <a:lnSpc>
+                <a:spcPct val="200000"/>
+              </a:lnSpc>
+            </a:pPr>
+            <a:r>
+              <a:rPr lang="fr-FR" dirty="0"/>
+              <a:t>Sécurité</a:t>
+            </a:r>
+          </a:p>
+          <a:p>
+            <a:pPr>
+              <a:lnSpc>
+                <a:spcPct val="200000"/>
+              </a:lnSpc>
+            </a:pPr>
+            <a:r>
+              <a:rPr lang="fr-FR" dirty="0"/>
+              <a:t>fiabilité</a:t>
+            </a:r>
+          </a:p>
+        </p:txBody>
+      </p:sp>
+      <p:sp>
+        <p:nvSpPr>
+          <p:cNvPr id="4" name="Espace réservé du pied de page 4">
+            <a:extLst>
+              <a:ext uri="{FF2B5EF4-FFF2-40B4-BE49-F238E27FC236}">
+                <a16:creationId xmlns:a16="http://schemas.microsoft.com/office/drawing/2014/main" id="{DB354BE9-A1A9-89B1-2F3D-79C2C05A1248}"/>
+              </a:ext>
+            </a:extLst>
+          </p:cNvPr>
+          <p:cNvSpPr>
+            <a:spLocks noGrp="1"/>
+          </p:cNvSpPr>
+          <p:nvPr>
+            <p:ph type="ftr" sz="quarter" idx="11"/>
+          </p:nvPr>
+        </p:nvSpPr>
+        <p:spPr>
+          <a:xfrm>
+            <a:off x="516621" y="6413448"/>
+            <a:ext cx="1095869" cy="250928"/>
+          </a:xfrm>
+        </p:spPr>
+        <p:txBody>
+          <a:bodyPr rtlCol="0"/>
+          <a:lstStyle/>
+          <a:p>
+            <a:pPr rtl="0"/>
+            <a:r>
+              <a:rPr lang="fr-FR" dirty="0"/>
+              <a:t>Octopus</a:t>
+            </a:r>
+          </a:p>
+        </p:txBody>
+      </p:sp>
+      <p:sp>
+        <p:nvSpPr>
+          <p:cNvPr id="5" name="Titre 1">
+            <a:extLst>
+              <a:ext uri="{FF2B5EF4-FFF2-40B4-BE49-F238E27FC236}">
+                <a16:creationId xmlns:a16="http://schemas.microsoft.com/office/drawing/2014/main" id="{44BCBF55-C696-ACAA-C9A2-04FA59334DEC}"/>
               </a:ext>
             </a:extLst>
           </p:cNvPr>
@@ -18925,28 +19070,27 @@
         </p:nvSpPr>
         <p:spPr>
           <a:xfrm>
-            <a:off x="3836598" y="3339561"/>
-            <a:ext cx="5433204" cy="365125"/>
+            <a:off x="362483" y="501650"/>
+            <a:ext cx="5111750" cy="461342"/>
           </a:xfrm>
           <a:prstGeom prst="rect">
             <a:avLst/>
           </a:prstGeom>
         </p:spPr>
         <p:txBody>
-          <a:bodyPr vert="horz" lIns="91440" tIns="45720" rIns="91440" bIns="45720" rtlCol="0">
-            <a:normAutofit lnSpcReduction="10000"/>
+          <a:bodyPr vert="horz" lIns="91440" tIns="45720" rIns="91440" bIns="45720" rtlCol="0" anchor="t">
+            <a:normAutofit fontScale="97500" lnSpcReduction="10000"/>
           </a:bodyPr>
           <a:lstStyle>
-            <a:lvl1pPr marL="0" indent="0" algn="l" defTabSz="914400" rtl="0" eaLnBrk="1" latinLnBrk="0" hangingPunct="1">
+            <a:lvl1pPr algn="l" defTabSz="914400" rtl="0" eaLnBrk="1" latinLnBrk="0" hangingPunct="1">
               <a:lnSpc>
                 <a:spcPct val="90000"/>
               </a:lnSpc>
               <a:spcBef>
-                <a:spcPts val="1000"/>
+                <a:spcPct val="0"/>
               </a:spcBef>
-              <a:buFont typeface="Arial" panose="020B0604020202020204" pitchFamily="34" charset="0"/>
-              <a:buNone/>
-              <a:defRPr lang="en-US" sz="2000" kern="1200" cap="all" spc="150" baseline="0" dirty="0">
+              <a:buNone/>
+              <a:defRPr lang="en-US" sz="2800" kern="1200" cap="all" spc="150" baseline="0" dirty="0">
                 <a:solidFill>
                   <a:schemeClr val="tx1">
                     <a:lumMod val="75000"/>
@@ -18958,381 +19102,11 @@
                 <a:cs typeface="+mj-cs"/>
               </a:defRPr>
             </a:lvl1pPr>
-            <a:lvl2pPr marL="685800" indent="-228600" algn="l" defTabSz="914400" rtl="0" eaLnBrk="1" latinLnBrk="0" hangingPunct="1">
-              <a:lnSpc>
-                <a:spcPct val="90000"/>
-              </a:lnSpc>
-              <a:spcBef>
-                <a:spcPts val="500"/>
-              </a:spcBef>
-              <a:buFont typeface="Arial" panose="020B0604020202020204" pitchFamily="34" charset="0"/>
-              <a:buChar char="•"/>
-              <a:defRPr sz="2400" kern="1200">
-                <a:solidFill>
-                  <a:schemeClr val="tx1">
-                    <a:lumMod val="75000"/>
-                    <a:lumOff val="25000"/>
-                  </a:schemeClr>
-                </a:solidFill>
-                <a:latin typeface="+mn-lt"/>
-                <a:ea typeface="+mn-ea"/>
-                <a:cs typeface="+mn-cs"/>
-              </a:defRPr>
-            </a:lvl2pPr>
-            <a:lvl3pPr marL="1143000" indent="-228600" algn="l" defTabSz="914400" rtl="0" eaLnBrk="1" latinLnBrk="0" hangingPunct="1">
-              <a:lnSpc>
-                <a:spcPct val="90000"/>
-              </a:lnSpc>
-              <a:spcBef>
-                <a:spcPts val="500"/>
-              </a:spcBef>
-              <a:buFont typeface="Arial" panose="020B0604020202020204" pitchFamily="34" charset="0"/>
-              <a:buChar char="•"/>
-              <a:defRPr sz="2000" kern="1200">
-                <a:solidFill>
-                  <a:schemeClr val="tx1">
-                    <a:lumMod val="75000"/>
-                    <a:lumOff val="25000"/>
-                  </a:schemeClr>
-                </a:solidFill>
-                <a:latin typeface="+mn-lt"/>
-                <a:ea typeface="+mn-ea"/>
-                <a:cs typeface="+mn-cs"/>
-              </a:defRPr>
-            </a:lvl3pPr>
-            <a:lvl4pPr marL="1600200" indent="-228600" algn="l" defTabSz="914400" rtl="0" eaLnBrk="1" latinLnBrk="0" hangingPunct="1">
-              <a:lnSpc>
-                <a:spcPct val="90000"/>
-              </a:lnSpc>
-              <a:spcBef>
-                <a:spcPts val="500"/>
-              </a:spcBef>
-              <a:buFont typeface="Arial" panose="020B0604020202020204" pitchFamily="34" charset="0"/>
-              <a:buChar char="•"/>
-              <a:defRPr sz="1800" kern="1200">
-                <a:solidFill>
-                  <a:schemeClr val="tx1">
-                    <a:lumMod val="75000"/>
-                    <a:lumOff val="25000"/>
-                  </a:schemeClr>
-                </a:solidFill>
-                <a:latin typeface="+mn-lt"/>
-                <a:ea typeface="+mn-ea"/>
-                <a:cs typeface="+mn-cs"/>
-              </a:defRPr>
-            </a:lvl4pPr>
-            <a:lvl5pPr marL="2057400" indent="-228600" algn="l" defTabSz="914400" rtl="0" eaLnBrk="1" latinLnBrk="0" hangingPunct="1">
-              <a:lnSpc>
-                <a:spcPct val="90000"/>
-              </a:lnSpc>
-              <a:spcBef>
-                <a:spcPts val="500"/>
-              </a:spcBef>
-              <a:buFont typeface="Arial" panose="020B0604020202020204" pitchFamily="34" charset="0"/>
-              <a:buChar char="•"/>
-              <a:defRPr sz="1800" kern="1200">
-                <a:solidFill>
-                  <a:schemeClr val="tx1">
-                    <a:lumMod val="75000"/>
-                    <a:lumOff val="25000"/>
-                  </a:schemeClr>
-                </a:solidFill>
-                <a:latin typeface="+mn-lt"/>
-                <a:ea typeface="+mn-ea"/>
-                <a:cs typeface="+mn-cs"/>
-              </a:defRPr>
-            </a:lvl5pPr>
-            <a:lvl6pPr marL="2514600" indent="-228600" algn="l" defTabSz="914400" rtl="0" eaLnBrk="1" latinLnBrk="0" hangingPunct="1">
-              <a:lnSpc>
-                <a:spcPct val="90000"/>
-              </a:lnSpc>
-              <a:spcBef>
-                <a:spcPts val="500"/>
-              </a:spcBef>
-              <a:buFont typeface="Arial" panose="020B0604020202020204" pitchFamily="34" charset="0"/>
-              <a:buChar char="•"/>
-              <a:defRPr sz="1800" kern="1200">
-                <a:solidFill>
-                  <a:schemeClr val="tx1"/>
-                </a:solidFill>
-                <a:latin typeface="+mn-lt"/>
-                <a:ea typeface="+mn-ea"/>
-                <a:cs typeface="+mn-cs"/>
-              </a:defRPr>
-            </a:lvl6pPr>
-            <a:lvl7pPr marL="2971800" indent="-228600" algn="l" defTabSz="914400" rtl="0" eaLnBrk="1" latinLnBrk="0" hangingPunct="1">
-              <a:lnSpc>
-                <a:spcPct val="90000"/>
-              </a:lnSpc>
-              <a:spcBef>
-                <a:spcPts val="500"/>
-              </a:spcBef>
-              <a:buFont typeface="Arial" panose="020B0604020202020204" pitchFamily="34" charset="0"/>
-              <a:buChar char="•"/>
-              <a:defRPr sz="1800" kern="1200">
-                <a:solidFill>
-                  <a:schemeClr val="tx1"/>
-                </a:solidFill>
-                <a:latin typeface="+mn-lt"/>
-                <a:ea typeface="+mn-ea"/>
-                <a:cs typeface="+mn-cs"/>
-              </a:defRPr>
-            </a:lvl7pPr>
-            <a:lvl8pPr marL="3429000" indent="-228600" algn="l" defTabSz="914400" rtl="0" eaLnBrk="1" latinLnBrk="0" hangingPunct="1">
-              <a:lnSpc>
-                <a:spcPct val="90000"/>
-              </a:lnSpc>
-              <a:spcBef>
-                <a:spcPts val="500"/>
-              </a:spcBef>
-              <a:buFont typeface="Arial" panose="020B0604020202020204" pitchFamily="34" charset="0"/>
-              <a:buChar char="•"/>
-              <a:defRPr sz="1800" kern="1200">
-                <a:solidFill>
-                  <a:schemeClr val="tx1"/>
-                </a:solidFill>
-                <a:latin typeface="+mn-lt"/>
-                <a:ea typeface="+mn-ea"/>
-                <a:cs typeface="+mn-cs"/>
-              </a:defRPr>
-            </a:lvl8pPr>
-            <a:lvl9pPr marL="3886200" indent="-228600" algn="l" defTabSz="914400" rtl="0" eaLnBrk="1" latinLnBrk="0" hangingPunct="1">
-              <a:lnSpc>
-                <a:spcPct val="90000"/>
-              </a:lnSpc>
-              <a:spcBef>
-                <a:spcPts val="500"/>
-              </a:spcBef>
-              <a:buFont typeface="Arial" panose="020B0604020202020204" pitchFamily="34" charset="0"/>
-              <a:buChar char="•"/>
-              <a:defRPr sz="1800" kern="1200">
-                <a:solidFill>
-                  <a:schemeClr val="tx1"/>
-                </a:solidFill>
-                <a:latin typeface="+mn-lt"/>
-                <a:ea typeface="+mn-ea"/>
-                <a:cs typeface="+mn-cs"/>
-              </a:defRPr>
-            </a:lvl9pPr>
           </a:lstStyle>
           <a:p>
             <a:r>
               <a:rPr lang="fr-FR" dirty="0"/>
-              <a:t>sécurité</a:t>
-            </a:r>
-          </a:p>
-        </p:txBody>
-      </p:sp>
-      <p:sp>
-        <p:nvSpPr>
-          <p:cNvPr id="8" name="Espace réservé du texte 2">
-            <a:extLst>
-              <a:ext uri="{FF2B5EF4-FFF2-40B4-BE49-F238E27FC236}">
-                <a16:creationId xmlns:a16="http://schemas.microsoft.com/office/drawing/2014/main" id="{1F6E46DD-3AB0-B786-6354-37BA52D7E3A2}"/>
-              </a:ext>
-            </a:extLst>
-          </p:cNvPr>
-          <p:cNvSpPr txBox="1">
-            <a:spLocks/>
-          </p:cNvSpPr>
-          <p:nvPr/>
-        </p:nvSpPr>
-        <p:spPr>
-          <a:xfrm>
-            <a:off x="3836598" y="2885598"/>
-            <a:ext cx="5433204" cy="365125"/>
-          </a:xfrm>
-          <a:prstGeom prst="rect">
-            <a:avLst/>
-          </a:prstGeom>
-        </p:spPr>
-        <p:txBody>
-          <a:bodyPr vert="horz" lIns="91440" tIns="45720" rIns="91440" bIns="45720" rtlCol="0">
-            <a:normAutofit lnSpcReduction="10000"/>
-          </a:bodyPr>
-          <a:lstStyle>
-            <a:lvl1pPr marL="0" indent="0" algn="l" defTabSz="914400" rtl="0" eaLnBrk="1" latinLnBrk="0" hangingPunct="1">
-              <a:lnSpc>
-                <a:spcPct val="90000"/>
-              </a:lnSpc>
-              <a:spcBef>
-                <a:spcPts val="1000"/>
-              </a:spcBef>
-              <a:buFont typeface="Arial" panose="020B0604020202020204" pitchFamily="34" charset="0"/>
-              <a:buNone/>
-              <a:defRPr lang="en-US" sz="2000" kern="1200" cap="all" spc="150" baseline="0" dirty="0">
-                <a:solidFill>
-                  <a:schemeClr val="tx1">
-                    <a:lumMod val="75000"/>
-                    <a:lumOff val="25000"/>
-                  </a:schemeClr>
-                </a:solidFill>
-                <a:latin typeface="+mj-lt"/>
-                <a:ea typeface="+mj-ea"/>
-                <a:cs typeface="+mj-cs"/>
-              </a:defRPr>
-            </a:lvl1pPr>
-            <a:lvl2pPr marL="685800" indent="-228600" algn="l" defTabSz="914400" rtl="0" eaLnBrk="1" latinLnBrk="0" hangingPunct="1">
-              <a:lnSpc>
-                <a:spcPct val="90000"/>
-              </a:lnSpc>
-              <a:spcBef>
-                <a:spcPts val="500"/>
-              </a:spcBef>
-              <a:buFont typeface="Arial" panose="020B0604020202020204" pitchFamily="34" charset="0"/>
-              <a:buChar char="•"/>
-              <a:defRPr sz="2400" kern="1200">
-                <a:solidFill>
-                  <a:schemeClr val="tx1">
-                    <a:lumMod val="75000"/>
-                    <a:lumOff val="25000"/>
-                  </a:schemeClr>
-                </a:solidFill>
-                <a:latin typeface="+mn-lt"/>
-                <a:ea typeface="+mn-ea"/>
-                <a:cs typeface="+mn-cs"/>
-              </a:defRPr>
-            </a:lvl2pPr>
-            <a:lvl3pPr marL="1143000" indent="-228600" algn="l" defTabSz="914400" rtl="0" eaLnBrk="1" latinLnBrk="0" hangingPunct="1">
-              <a:lnSpc>
-                <a:spcPct val="90000"/>
-              </a:lnSpc>
-              <a:spcBef>
-                <a:spcPts val="500"/>
-              </a:spcBef>
-              <a:buFont typeface="Arial" panose="020B0604020202020204" pitchFamily="34" charset="0"/>
-              <a:buChar char="•"/>
-              <a:defRPr sz="2000" kern="1200">
-                <a:solidFill>
-                  <a:schemeClr val="tx1">
-                    <a:lumMod val="75000"/>
-                    <a:lumOff val="25000"/>
-                  </a:schemeClr>
-                </a:solidFill>
-                <a:latin typeface="+mn-lt"/>
-                <a:ea typeface="+mn-ea"/>
-                <a:cs typeface="+mn-cs"/>
-              </a:defRPr>
-            </a:lvl3pPr>
-            <a:lvl4pPr marL="1600200" indent="-228600" algn="l" defTabSz="914400" rtl="0" eaLnBrk="1" latinLnBrk="0" hangingPunct="1">
-              <a:lnSpc>
-                <a:spcPct val="90000"/>
-              </a:lnSpc>
-              <a:spcBef>
-                <a:spcPts val="500"/>
-              </a:spcBef>
-              <a:buFont typeface="Arial" panose="020B0604020202020204" pitchFamily="34" charset="0"/>
-              <a:buChar char="•"/>
-              <a:defRPr sz="1800" kern="1200">
-                <a:solidFill>
-                  <a:schemeClr val="tx1">
-                    <a:lumMod val="75000"/>
-                    <a:lumOff val="25000"/>
-                  </a:schemeClr>
-                </a:solidFill>
-                <a:latin typeface="+mn-lt"/>
-                <a:ea typeface="+mn-ea"/>
-                <a:cs typeface="+mn-cs"/>
-              </a:defRPr>
-            </a:lvl4pPr>
-            <a:lvl5pPr marL="2057400" indent="-228600" algn="l" defTabSz="914400" rtl="0" eaLnBrk="1" latinLnBrk="0" hangingPunct="1">
-              <a:lnSpc>
-                <a:spcPct val="90000"/>
-              </a:lnSpc>
-              <a:spcBef>
-                <a:spcPts val="500"/>
-              </a:spcBef>
-              <a:buFont typeface="Arial" panose="020B0604020202020204" pitchFamily="34" charset="0"/>
-              <a:buChar char="•"/>
-              <a:defRPr sz="1800" kern="1200">
-                <a:solidFill>
-                  <a:schemeClr val="tx1">
-                    <a:lumMod val="75000"/>
-                    <a:lumOff val="25000"/>
-                  </a:schemeClr>
-                </a:solidFill>
-                <a:latin typeface="+mn-lt"/>
-                <a:ea typeface="+mn-ea"/>
-                <a:cs typeface="+mn-cs"/>
-              </a:defRPr>
-            </a:lvl5pPr>
-            <a:lvl6pPr marL="2514600" indent="-228600" algn="l" defTabSz="914400" rtl="0" eaLnBrk="1" latinLnBrk="0" hangingPunct="1">
-              <a:lnSpc>
-                <a:spcPct val="90000"/>
-              </a:lnSpc>
-              <a:spcBef>
-                <a:spcPts val="500"/>
-              </a:spcBef>
-              <a:buFont typeface="Arial" panose="020B0604020202020204" pitchFamily="34" charset="0"/>
-              <a:buChar char="•"/>
-              <a:defRPr sz="1800" kern="1200">
-                <a:solidFill>
-                  <a:schemeClr val="tx1"/>
-                </a:solidFill>
-                <a:latin typeface="+mn-lt"/>
-                <a:ea typeface="+mn-ea"/>
-                <a:cs typeface="+mn-cs"/>
-              </a:defRPr>
-            </a:lvl6pPr>
-            <a:lvl7pPr marL="2971800" indent="-228600" algn="l" defTabSz="914400" rtl="0" eaLnBrk="1" latinLnBrk="0" hangingPunct="1">
-              <a:lnSpc>
-                <a:spcPct val="90000"/>
-              </a:lnSpc>
-              <a:spcBef>
-                <a:spcPts val="500"/>
-              </a:spcBef>
-              <a:buFont typeface="Arial" panose="020B0604020202020204" pitchFamily="34" charset="0"/>
-              <a:buChar char="•"/>
-              <a:defRPr sz="1800" kern="1200">
-                <a:solidFill>
-                  <a:schemeClr val="tx1"/>
-                </a:solidFill>
-                <a:latin typeface="+mn-lt"/>
-                <a:ea typeface="+mn-ea"/>
-                <a:cs typeface="+mn-cs"/>
-              </a:defRPr>
-            </a:lvl7pPr>
-            <a:lvl8pPr marL="3429000" indent="-228600" algn="l" defTabSz="914400" rtl="0" eaLnBrk="1" latinLnBrk="0" hangingPunct="1">
-              <a:lnSpc>
-                <a:spcPct val="90000"/>
-              </a:lnSpc>
-              <a:spcBef>
-                <a:spcPts val="500"/>
-              </a:spcBef>
-              <a:buFont typeface="Arial" panose="020B0604020202020204" pitchFamily="34" charset="0"/>
-              <a:buChar char="•"/>
-              <a:defRPr sz="1800" kern="1200">
-                <a:solidFill>
-                  <a:schemeClr val="tx1"/>
-                </a:solidFill>
-                <a:latin typeface="+mn-lt"/>
-                <a:ea typeface="+mn-ea"/>
-                <a:cs typeface="+mn-cs"/>
-              </a:defRPr>
-            </a:lvl8pPr>
-            <a:lvl9pPr marL="3886200" indent="-228600" algn="l" defTabSz="914400" rtl="0" eaLnBrk="1" latinLnBrk="0" hangingPunct="1">
-              <a:lnSpc>
-                <a:spcPct val="90000"/>
-              </a:lnSpc>
-              <a:spcBef>
-                <a:spcPts val="500"/>
-              </a:spcBef>
-              <a:buFont typeface="Arial" panose="020B0604020202020204" pitchFamily="34" charset="0"/>
-              <a:buChar char="•"/>
-              <a:defRPr sz="1800" kern="1200">
-                <a:solidFill>
-                  <a:schemeClr val="tx1"/>
-                </a:solidFill>
-                <a:latin typeface="+mn-lt"/>
-                <a:ea typeface="+mn-ea"/>
-                <a:cs typeface="+mn-cs"/>
-              </a:defRPr>
-            </a:lvl9pPr>
-          </a:lstStyle>
-          <a:p>
-            <a:r>
-              <a:rPr lang="fr-FR" dirty="0"/>
-              <a:t>interconnexion</a:t>
+              <a:t>Notre solution</a:t>
             </a:r>
           </a:p>
         </p:txBody>
@@ -19385,7 +19159,7 @@
         </p:nvSpPr>
         <p:spPr>
           <a:xfrm>
-            <a:off x="1342197" y="1063488"/>
+            <a:off x="362483" y="501650"/>
             <a:ext cx="5111750" cy="461342"/>
           </a:xfrm>
         </p:spPr>
@@ -19400,76 +19174,6 @@
               <a:rPr lang="fr-FR" dirty="0"/>
               <a:t>Notre proposition</a:t>
             </a:r>
-          </a:p>
-        </p:txBody>
-      </p:sp>
-      <p:sp>
-        <p:nvSpPr>
-          <p:cNvPr id="4" name="Espace réservé de la date 3">
-            <a:extLst>
-              <a:ext uri="{FF2B5EF4-FFF2-40B4-BE49-F238E27FC236}">
-                <a16:creationId xmlns:a16="http://schemas.microsoft.com/office/drawing/2014/main" id="{5C2ACA2A-6BBE-47CF-B76F-F56C9DBF77E6}"/>
-              </a:ext>
-            </a:extLst>
-          </p:cNvPr>
-          <p:cNvSpPr>
-            <a:spLocks noGrp="1"/>
-          </p:cNvSpPr>
-          <p:nvPr>
-            <p:ph type="dt" sz="half" idx="10"/>
-          </p:nvPr>
-        </p:nvSpPr>
-        <p:spPr>
-          <a:xfrm>
-            <a:off x="838200" y="6356350"/>
-            <a:ext cx="2743200" cy="365125"/>
-          </a:xfrm>
-        </p:spPr>
-        <p:txBody>
-          <a:bodyPr rtlCol="0"/>
-          <a:lstStyle/>
-          <a:p>
-            <a:pPr rtl="0"/>
-            <a:r>
-              <a:rPr lang="fr-FR"/>
-              <a:t>20XX</a:t>
-            </a:r>
-            <a:endParaRPr lang="fr-FR" dirty="0"/>
-          </a:p>
-        </p:txBody>
-      </p:sp>
-      <p:sp>
-        <p:nvSpPr>
-          <p:cNvPr id="5" name="Espace réservé du pied de page 4">
-            <a:extLst>
-              <a:ext uri="{FF2B5EF4-FFF2-40B4-BE49-F238E27FC236}">
-                <a16:creationId xmlns:a16="http://schemas.microsoft.com/office/drawing/2014/main" id="{396A095E-DB05-47EC-A2D5-47398A4A00B4}"/>
-              </a:ext>
-            </a:extLst>
-          </p:cNvPr>
-          <p:cNvSpPr>
-            <a:spLocks noGrp="1"/>
-          </p:cNvSpPr>
-          <p:nvPr>
-            <p:ph type="ftr" sz="quarter" idx="11"/>
-          </p:nvPr>
-        </p:nvSpPr>
-        <p:spPr>
-          <a:xfrm>
-            <a:off x="5224463" y="6356350"/>
-            <a:ext cx="1743075" cy="365125"/>
-          </a:xfrm>
-        </p:spPr>
-        <p:txBody>
-          <a:bodyPr rtlCol="0"/>
-          <a:lstStyle/>
-          <a:p>
-            <a:pPr rtl="0"/>
-            <a:r>
-              <a:rPr lang="fr-FR"/>
-              <a:t>Pitch Deck</a:t>
-            </a:r>
-            <a:endParaRPr lang="fr-FR" dirty="0"/>
           </a:p>
         </p:txBody>
       </p:sp>
@@ -19511,28 +19215,171 @@
       </p:sp>
       <p:sp>
         <p:nvSpPr>
-          <p:cNvPr id="8" name="Espace réservé du texte 7">
-            <a:extLst>
-              <a:ext uri="{FF2B5EF4-FFF2-40B4-BE49-F238E27FC236}">
-                <a16:creationId xmlns:a16="http://schemas.microsoft.com/office/drawing/2014/main" id="{A48B736A-6BFC-7108-5543-3E63E6556E07}"/>
-              </a:ext>
-            </a:extLst>
-          </p:cNvPr>
-          <p:cNvSpPr>
-            <a:spLocks noGrp="1"/>
-          </p:cNvSpPr>
-          <p:nvPr>
-            <p:ph type="body" idx="1"/>
-          </p:nvPr>
-        </p:nvSpPr>
-        <p:spPr/>
-        <p:txBody>
-          <a:bodyPr/>
+          <p:cNvPr id="7" name="ZoneTexte 6">
+            <a:extLst>
+              <a:ext uri="{FF2B5EF4-FFF2-40B4-BE49-F238E27FC236}">
+                <a16:creationId xmlns:a16="http://schemas.microsoft.com/office/drawing/2014/main" id="{2438EDDC-1CC5-4FD2-E6BD-9202134A4602}"/>
+              </a:ext>
+            </a:extLst>
+          </p:cNvPr>
+          <p:cNvSpPr txBox="1"/>
+          <p:nvPr/>
+        </p:nvSpPr>
+        <p:spPr>
+          <a:xfrm>
+            <a:off x="3018502" y="1413775"/>
+            <a:ext cx="5594555" cy="4524315"/>
+          </a:xfrm>
+          <a:prstGeom prst="rect">
+            <a:avLst/>
+          </a:prstGeom>
+          <a:noFill/>
+        </p:spPr>
+        <p:txBody>
+          <a:bodyPr wrap="square">
+            <a:spAutoFit/>
+          </a:bodyPr>
           <a:lstStyle/>
           <a:p>
             <a:r>
-              <a:rPr lang="fr-FR" i="1" dirty="0"/>
-              <a:t>Insérer Notre devis</a:t>
+              <a:rPr lang="fr-FR" dirty="0"/>
+              <a:t>			</a:t>
+            </a:r>
+          </a:p>
+          <a:p>
+            <a:r>
+              <a:rPr lang="fr-FR" b="1" dirty="0"/>
+              <a:t>Matériel			Qté	Px Unit	Total</a:t>
+            </a:r>
+          </a:p>
+          <a:p>
+            <a:r>
+              <a:rPr lang="fr-FR" dirty="0"/>
+              <a:t>Cisco ASA 5506 Firewall	1	  900	  900</a:t>
+            </a:r>
+          </a:p>
+          <a:p>
+            <a:r>
+              <a:rPr lang="fr-FR" sz="1400" dirty="0"/>
+              <a:t>Cisco </a:t>
+            </a:r>
+            <a:r>
+              <a:rPr lang="fr-FR" sz="1400" dirty="0" err="1"/>
+              <a:t>Cradlepoint</a:t>
+            </a:r>
+            <a:r>
+              <a:rPr lang="fr-FR" sz="1400" dirty="0"/>
+              <a:t> IBR1700 5Ghz</a:t>
+            </a:r>
+            <a:r>
+              <a:rPr lang="fr-FR" dirty="0"/>
+              <a:t>	1	1800	1800</a:t>
+            </a:r>
+          </a:p>
+          <a:p>
+            <a:r>
+              <a:rPr lang="fr-FR" dirty="0"/>
+              <a:t>Switch CISCO 3650	1	1800	1800</a:t>
+            </a:r>
+          </a:p>
+          <a:p>
+            <a:r>
+              <a:rPr lang="fr-FR" dirty="0"/>
+              <a:t>Switch CISCO 2960	1	  650	  650</a:t>
+            </a:r>
+          </a:p>
+          <a:p>
+            <a:r>
+              <a:rPr lang="fr-FR" dirty="0"/>
+              <a:t>Câbles et Accessoires	Lot	  600	  600</a:t>
+            </a:r>
+          </a:p>
+          <a:p>
+            <a:r>
+              <a:rPr lang="fr-FR" dirty="0"/>
+              <a:t>Sous-total Matériel			5750</a:t>
+            </a:r>
+          </a:p>
+          <a:p>
+            <a:r>
+              <a:rPr lang="fr-FR" dirty="0"/>
+              <a:t>			</a:t>
+            </a:r>
+          </a:p>
+          <a:p>
+            <a:r>
+              <a:rPr lang="fr-FR" b="1" dirty="0"/>
+              <a:t>Prestation		Jours	TJM	Total</a:t>
+            </a:r>
+          </a:p>
+          <a:p>
+            <a:r>
+              <a:rPr lang="fr-FR" dirty="0"/>
+              <a:t>Étude et conception	3	  650	1950</a:t>
+            </a:r>
+          </a:p>
+          <a:p>
+            <a:r>
+              <a:rPr lang="fr-FR" dirty="0"/>
+              <a:t>Installation et config	2	  650	1300</a:t>
+            </a:r>
+          </a:p>
+          <a:p>
+            <a:r>
+              <a:rPr lang="fr-FR" dirty="0"/>
+              <a:t>Test + Recette		1	  300	  300</a:t>
+            </a:r>
+          </a:p>
+          <a:p>
+            <a:r>
+              <a:rPr lang="fr-FR" dirty="0"/>
+              <a:t>Sous-Total Prestation			3550</a:t>
+            </a:r>
+          </a:p>
+          <a:p>
+            <a:r>
+              <a:rPr lang="fr-FR" dirty="0"/>
+              <a:t>			</a:t>
+            </a:r>
+          </a:p>
+          <a:p>
+            <a:r>
+              <a:rPr lang="fr-FR" dirty="0"/>
+              <a:t>Total Global			               9300</a:t>
+            </a:r>
+          </a:p>
+        </p:txBody>
+      </p:sp>
+      <p:sp>
+        <p:nvSpPr>
+          <p:cNvPr id="11" name="Espace réservé du pied de page 4">
+            <a:extLst>
+              <a:ext uri="{FF2B5EF4-FFF2-40B4-BE49-F238E27FC236}">
+                <a16:creationId xmlns:a16="http://schemas.microsoft.com/office/drawing/2014/main" id="{F9471A61-6930-2392-19A6-55B4274D4D02}"/>
+              </a:ext>
+            </a:extLst>
+          </p:cNvPr>
+          <p:cNvSpPr>
+            <a:spLocks noGrp="1"/>
+          </p:cNvSpPr>
+          <p:nvPr>
+            <p:ph type="ftr" sz="quarter" idx="11"/>
+          </p:nvPr>
+        </p:nvSpPr>
+        <p:spPr>
+          <a:xfrm>
+            <a:off x="516621" y="6413448"/>
+            <a:ext cx="1095869" cy="250928"/>
+          </a:xfrm>
+        </p:spPr>
+        <p:txBody>
+          <a:bodyPr rtlCol="0"/>
+          <a:lstStyle/>
+          <a:p>
+            <a:pPr rtl="0"/>
+            <a:r>
+              <a:rPr lang="fr-FR" dirty="0"/>
+              <a:t>Octopus</a:t>
             </a:r>
           </a:p>
         </p:txBody>
@@ -19569,24 +19416,24 @@
       </p:grpSpPr>
       <p:sp>
         <p:nvSpPr>
-          <p:cNvPr id="6" name="Espace réservé de la date 5">
-            <a:extLst>
-              <a:ext uri="{FF2B5EF4-FFF2-40B4-BE49-F238E27FC236}">
-                <a16:creationId xmlns:a16="http://schemas.microsoft.com/office/drawing/2014/main" id="{B69DF042-37C5-4E09-AA4C-AA66649C9533}"/>
-              </a:ext>
-            </a:extLst>
-          </p:cNvPr>
-          <p:cNvSpPr>
-            <a:spLocks noGrp="1"/>
-          </p:cNvSpPr>
-          <p:nvPr>
-            <p:ph type="dt" sz="half" idx="10"/>
-          </p:nvPr>
-        </p:nvSpPr>
-        <p:spPr>
-          <a:xfrm>
-            <a:off x="1333500" y="6356350"/>
-            <a:ext cx="985157" cy="365125"/>
+          <p:cNvPr id="5" name="Espace réservé du pied de page 4">
+            <a:extLst>
+              <a:ext uri="{FF2B5EF4-FFF2-40B4-BE49-F238E27FC236}">
+                <a16:creationId xmlns:a16="http://schemas.microsoft.com/office/drawing/2014/main" id="{AF29EA23-F34E-486A-B8B2-0C3019266975}"/>
+              </a:ext>
+            </a:extLst>
+          </p:cNvPr>
+          <p:cNvSpPr>
+            <a:spLocks noGrp="1"/>
+          </p:cNvSpPr>
+          <p:nvPr>
+            <p:ph type="ftr" sz="quarter" idx="11"/>
+          </p:nvPr>
+        </p:nvSpPr>
+        <p:spPr>
+          <a:xfrm>
+            <a:off x="516621" y="6413448"/>
+            <a:ext cx="1095869" cy="250928"/>
           </a:xfrm>
         </p:spPr>
         <p:txBody>
@@ -19596,78 +19443,8 @@
             <a:pPr rtl="0"/>
             <a:r>
               <a:rPr lang="fr-FR" dirty="0"/>
-              <a:t>Novembre 2025</a:t>
-            </a:r>
-          </a:p>
-        </p:txBody>
-      </p:sp>
-      <p:sp>
-        <p:nvSpPr>
-          <p:cNvPr id="5" name="Espace réservé du pied de page 4">
-            <a:extLst>
-              <a:ext uri="{FF2B5EF4-FFF2-40B4-BE49-F238E27FC236}">
-                <a16:creationId xmlns:a16="http://schemas.microsoft.com/office/drawing/2014/main" id="{AF29EA23-F34E-486A-B8B2-0C3019266975}"/>
-              </a:ext>
-            </a:extLst>
-          </p:cNvPr>
-          <p:cNvSpPr>
-            <a:spLocks noGrp="1"/>
-          </p:cNvSpPr>
-          <p:nvPr>
-            <p:ph type="ftr" sz="quarter" idx="11"/>
-          </p:nvPr>
-        </p:nvSpPr>
-        <p:spPr>
-          <a:xfrm>
-            <a:off x="2669886" y="6356349"/>
-            <a:ext cx="2482842" cy="365125"/>
-          </a:xfrm>
-        </p:spPr>
-        <p:txBody>
-          <a:bodyPr rtlCol="0"/>
-          <a:lstStyle/>
-          <a:p>
-            <a:pPr rtl="0"/>
-            <a:r>
-              <a:rPr lang="fr-FR"/>
-              <a:t>Pitch Deck</a:t>
-            </a:r>
-          </a:p>
-        </p:txBody>
-      </p:sp>
-      <p:sp>
-        <p:nvSpPr>
-          <p:cNvPr id="4" name="Espace réservé du numéro de diapositive 3">
-            <a:extLst>
-              <a:ext uri="{FF2B5EF4-FFF2-40B4-BE49-F238E27FC236}">
-                <a16:creationId xmlns:a16="http://schemas.microsoft.com/office/drawing/2014/main" id="{328F602C-7F98-4C02-99D4-ED65E00D66A4}"/>
-              </a:ext>
-            </a:extLst>
-          </p:cNvPr>
-          <p:cNvSpPr>
-            <a:spLocks noGrp="1"/>
-          </p:cNvSpPr>
-          <p:nvPr>
-            <p:ph type="sldNum" sz="quarter" idx="12"/>
-          </p:nvPr>
-        </p:nvSpPr>
-        <p:spPr>
-          <a:xfrm>
-            <a:off x="5536305" y="6356350"/>
-            <a:ext cx="987552" cy="365125"/>
-          </a:xfrm>
-        </p:spPr>
-        <p:txBody>
-          <a:bodyPr rtlCol="0"/>
-          <a:lstStyle/>
-          <a:p>
-            <a:pPr rtl="0"/>
-            <a:fld id="{19B51A1E-902D-48AF-9020-955120F399B6}" type="slidenum">
-              <a:rPr lang="fr-FR" smtClean="0"/>
-              <a:pPr rtl="0"/>
-              <a:t>8</a:t>
-            </a:fld>
-            <a:endParaRPr lang="fr-FR"/>
+              <a:t>Octopus</a:t>
+            </a:r>
           </a:p>
         </p:txBody>
       </p:sp>
@@ -19686,7 +19463,7 @@
           <p:nvPr>
             <p:extLst>
               <p:ext uri="{D42A27DB-BD31-4B8C-83A1-F6EECF244321}">
-                <p14:modId xmlns:p14="http://schemas.microsoft.com/office/powerpoint/2010/main" val="2096652293"/>
+                <p14:modId xmlns:p14="http://schemas.microsoft.com/office/powerpoint/2010/main" val="2294529585"/>
               </p:ext>
             </p:extLst>
           </p:nvPr>
@@ -19724,7 +19501,7 @@
                     <a:lstStyle/>
                     <a:p>
                       <a:r>
-                        <a:rPr lang="fr-FR" b="1" dirty="0">
+                        <a:rPr lang="fr-FR" sz="2400" b="1" dirty="0">
                           <a:solidFill>
                             <a:schemeClr val="tx1"/>
                           </a:solidFill>
@@ -19767,7 +19544,7 @@
                           <a:ea typeface="+mn-ea"/>
                           <a:cs typeface="+mn-cs"/>
                         </a:rPr>
-                        <a:t>C'est la personne qui exécute concrètement la tâche. Elle effectue le travail et s'assure de sa bonne réalisation.</a:t>
+                        <a:t>Octopus</a:t>
                       </a:r>
                       <a:endParaRPr lang="fr-FR" i="1" dirty="0">
                         <a:solidFill>
@@ -19799,7 +19576,7 @@
                     <a:lstStyle/>
                     <a:p>
                       <a:r>
-                        <a:rPr lang="fr-FR" b="1" dirty="0">
+                        <a:rPr lang="fr-FR" sz="2400" b="1" dirty="0">
                           <a:solidFill>
                             <a:schemeClr val="tx1"/>
                           </a:solidFill>
@@ -19815,7 +19592,7 @@
                       </a:endParaRPr>
                     </a:p>
                     <a:p>
-                      <a:pPr marL="0" marR="0" lvl="0" indent="0" algn="l" defTabSz="914400" rtl="0" eaLnBrk="1" fontAlgn="auto" latinLnBrk="0" hangingPunct="1">
+                      <a:pPr marL="0" marR="0" lvl="0" indent="0" algn="ctr" defTabSz="914400" rtl="0" eaLnBrk="1" fontAlgn="auto" latinLnBrk="0" hangingPunct="1">
                         <a:lnSpc>
                           <a:spcPct val="100000"/>
                         </a:lnSpc>
@@ -19833,40 +19610,22 @@
                         <a:defRPr/>
                       </a:pPr>
                       <a:r>
-                        <a:rPr lang="fr-FR" sz="1800" b="0" i="1" u="none" strike="noStrike" kern="1200" dirty="0">
+                        <a:rPr lang="fr-FR" i="1" dirty="0">
                           <a:solidFill>
                             <a:schemeClr val="tx1"/>
                           </a:solidFill>
                           <a:effectLst/>
-                          <a:latin typeface="+mn-lt"/>
-                          <a:ea typeface="+mn-ea"/>
-                          <a:cs typeface="+mn-cs"/>
                         </a:rPr>
-                        <a:t>Responsable ultime de la tâche, cette personne valide le travail et rend compte. </a:t>
+                        <a:t>RSSI Click &amp; </a:t>
                       </a:r>
                       <a:r>
-                        <a:rPr lang="fr-FR" sz="1800" b="1" i="1" u="none" strike="noStrike" kern="1200" dirty="0">
+                        <a:rPr lang="fr-FR" i="1" dirty="0" err="1">
                           <a:solidFill>
                             <a:schemeClr val="tx1"/>
                           </a:solidFill>
                           <a:effectLst/>
-                          <a:latin typeface="+mn-lt"/>
-                          <a:ea typeface="+mn-ea"/>
-                          <a:cs typeface="+mn-cs"/>
                         </a:rPr>
-                        <a:t>Un seul A par tâche</a:t>
-                      </a:r>
-                      <a:r>
-                        <a:rPr lang="fr-FR" sz="1800" b="0" i="1" u="none" strike="noStrike" kern="1200" dirty="0">
-                          <a:solidFill>
-                            <a:schemeClr val="tx1"/>
-                          </a:solidFill>
-                          <a:effectLst/>
-                          <a:latin typeface="+mn-lt"/>
-                          <a:ea typeface="+mn-ea"/>
-                          <a:cs typeface="+mn-cs"/>
-                        </a:rPr>
-                        <a:t> pour éviter toute ambiguïté.</a:t>
+                        <a:t>Connect</a:t>
                       </a:r>
                       <a:endParaRPr lang="fr-FR" i="1" dirty="0">
                         <a:solidFill>
@@ -19904,7 +19663,7 @@
                     <a:lstStyle/>
                     <a:p>
                       <a:r>
-                        <a:rPr lang="fr-FR" b="1" dirty="0">
+                        <a:rPr lang="fr-FR" sz="2400" b="1" dirty="0">
                           <a:solidFill>
                             <a:schemeClr val="tx1"/>
                           </a:solidFill>
@@ -19947,7 +19706,16 @@
                           <a:ea typeface="+mn-ea"/>
                           <a:cs typeface="+mn-cs"/>
                         </a:rPr>
-                        <a:t>Expert sollicité pour son avis et ses recommandations. La communication est bidirectionnelle avec échanges d'informations.</a:t>
+                        <a:t>Administrateur système </a:t>
+                      </a:r>
+                      <a:r>
+                        <a:rPr lang="fr-FR" i="1" dirty="0" err="1">
+                          <a:solidFill>
+                            <a:schemeClr val="tx1"/>
+                          </a:solidFill>
+                          <a:effectLst/>
+                        </a:rPr>
+                        <a:t>Innovatech</a:t>
                       </a:r>
                       <a:endParaRPr lang="fr-FR" i="1" dirty="0">
                         <a:solidFill>
@@ -19955,6 +19723,34 @@
                         </a:solidFill>
                         <a:effectLst/>
                       </a:endParaRPr>
+                    </a:p>
+                    <a:p>
+                      <a:pPr marL="0" marR="0" lvl="0" indent="0" algn="ctr" defTabSz="914400" rtl="0" eaLnBrk="1" fontAlgn="auto" latinLnBrk="0" hangingPunct="1">
+                        <a:lnSpc>
+                          <a:spcPct val="100000"/>
+                        </a:lnSpc>
+                        <a:spcBef>
+                          <a:spcPts val="0"/>
+                        </a:spcBef>
+                        <a:spcAft>
+                          <a:spcPts val="0"/>
+                        </a:spcAft>
+                        <a:buClrTx/>
+                        <a:buSzTx/>
+                        <a:buFontTx/>
+                        <a:buNone/>
+                        <a:tabLst/>
+                        <a:defRPr/>
+                      </a:pPr>
+                      <a:r>
+                        <a:rPr lang="fr-FR" i="1" dirty="0">
+                          <a:solidFill>
+                            <a:schemeClr val="tx1"/>
+                          </a:solidFill>
+                          <a:effectLst/>
+                        </a:rPr>
+                        <a:t>Octopus</a:t>
+                      </a:r>
                     </a:p>
                     <a:p>
                       <a:endParaRPr lang="fr-FR" b="1" dirty="0">
@@ -19995,7 +19791,7 @@
                         <a:defRPr/>
                       </a:pPr>
                       <a:r>
-                        <a:rPr lang="fr-FR" b="1" dirty="0">
+                        <a:rPr lang="fr-FR" sz="2400" b="1" dirty="0">
                           <a:solidFill>
                             <a:schemeClr val="tx1"/>
                           </a:solidFill>
@@ -20028,7 +19824,7 @@
                       </a:endParaRPr>
                     </a:p>
                     <a:p>
-                      <a:pPr marL="0" marR="0" lvl="0" indent="0" algn="l" defTabSz="914400" rtl="0" eaLnBrk="1" fontAlgn="auto" latinLnBrk="0" hangingPunct="1">
+                      <a:pPr marL="0" marR="0" lvl="0" indent="0" algn="ctr" defTabSz="914400" rtl="0" eaLnBrk="1" fontAlgn="auto" latinLnBrk="0" hangingPunct="1">
                         <a:lnSpc>
                           <a:spcPct val="100000"/>
                         </a:lnSpc>
@@ -20046,17 +19842,48 @@
                         <a:defRPr/>
                       </a:pPr>
                       <a:r>
-                        <a:rPr lang="fr-FR" sz="1800" b="0" i="1" u="none" strike="noStrike" kern="1200" dirty="0">
+                        <a:rPr lang="fr-FR" i="1" dirty="0">
                           <a:solidFill>
                             <a:schemeClr val="tx1"/>
                           </a:solidFill>
                           <a:effectLst/>
-                          <a:latin typeface="+mn-lt"/>
-                          <a:ea typeface="+mn-ea"/>
-                          <a:cs typeface="+mn-cs"/>
                         </a:rPr>
-                        <a:t>Personne tenue au courant de l'avancement et des résultats. Communication unidirectionnelle, sans participation active.</a:t>
+                        <a:t>RSSI Click &amp; </a:t>
                       </a:r>
+                      <a:r>
+                        <a:rPr lang="fr-FR" i="1" dirty="0" err="1">
+                          <a:solidFill>
+                            <a:schemeClr val="tx1"/>
+                          </a:solidFill>
+                          <a:effectLst/>
+                        </a:rPr>
+                        <a:t>Connect</a:t>
+                      </a:r>
+                      <a:endParaRPr lang="fr-FR" i="1" dirty="0">
+                        <a:solidFill>
+                          <a:schemeClr val="tx1"/>
+                        </a:solidFill>
+                        <a:effectLst/>
+                      </a:endParaRPr>
+                    </a:p>
+                    <a:p>
+                      <a:pPr marL="0" marR="0" lvl="0" indent="0" algn="ctr" defTabSz="914400" rtl="0" eaLnBrk="1" fontAlgn="auto" latinLnBrk="0" hangingPunct="1">
+                        <a:lnSpc>
+                          <a:spcPct val="100000"/>
+                        </a:lnSpc>
+                        <a:spcBef>
+                          <a:spcPts val="0"/>
+                        </a:spcBef>
+                        <a:spcAft>
+                          <a:spcPts val="0"/>
+                        </a:spcAft>
+                        <a:buClrTx/>
+                        <a:buSzTx/>
+                        <a:buFontTx/>
+                        <a:buNone/>
+                        <a:tabLst/>
+                        <a:defRPr/>
+                      </a:pPr>
                       <a:endParaRPr lang="fr-FR" i="1" dirty="0">
                         <a:solidFill>
                           <a:schemeClr val="tx1"/>
@@ -20090,6 +19917,42 @@
           </a:graphicData>
         </a:graphic>
       </p:graphicFrame>
+      <p:sp>
+        <p:nvSpPr>
+          <p:cNvPr id="2" name="Titre 1">
+            <a:extLst>
+              <a:ext uri="{FF2B5EF4-FFF2-40B4-BE49-F238E27FC236}">
+                <a16:creationId xmlns:a16="http://schemas.microsoft.com/office/drawing/2014/main" id="{F3922418-3FB2-71B5-11E0-EEEF5E0CD5A8}"/>
+              </a:ext>
+            </a:extLst>
+          </p:cNvPr>
+          <p:cNvSpPr>
+            <a:spLocks noGrp="1"/>
+          </p:cNvSpPr>
+          <p:nvPr>
+            <p:ph type="title"/>
+          </p:nvPr>
+        </p:nvSpPr>
+        <p:spPr>
+          <a:xfrm>
+            <a:off x="362483" y="501650"/>
+            <a:ext cx="2634717" cy="461342"/>
+          </a:xfrm>
+        </p:spPr>
+        <p:txBody>
+          <a:bodyPr rtlCol="0">
+            <a:normAutofit fontScale="90000"/>
+          </a:bodyPr>
+          <a:lstStyle/>
+          <a:p>
+            <a:pPr rtl="0"/>
+            <a:r>
+              <a:rPr lang="fr-FR" dirty="0"/>
+              <a:t>MATRICE RACI</a:t>
+            </a:r>
+          </a:p>
+        </p:txBody>
+      </p:sp>
     </p:spTree>
     <p:extLst>
       <p:ext uri="{BB962C8B-B14F-4D97-AF65-F5344CB8AC3E}">
@@ -21070,15 +20933,6 @@
 </file>
 
 <file path=customXml/item1.xml><?xml version="1.0" encoding="utf-8"?>
-<?mso-contentType ?>
-<FormTemplates xmlns="http://schemas.microsoft.com/sharepoint/v3/contenttype/forms">
-  <Display>DocumentLibraryForm</Display>
-  <Edit>DocumentLibraryForm</Edit>
-  <New>DocumentLibraryForm</New>
-</FormTemplates>
-</file>
-
-<file path=customXml/item2.xml><?xml version="1.0" encoding="utf-8"?>
 <ct:contentTypeSchema xmlns:ct="http://schemas.microsoft.com/office/2006/metadata/contentType" xmlns:ma="http://schemas.microsoft.com/office/2006/metadata/properties/metaAttributes" ct:_="" ma:_="" ma:contentTypeName="Document" ma:contentTypeID="0x01010079F111ED35F8CC479449609E8A0923A6" ma:contentTypeVersion="20" ma:contentTypeDescription="Create a new document." ma:contentTypeScope="" ma:versionID="1267097ee5f5874adfcc408041ae252e">
   <xsd:schema xmlns:xsd="http://www.w3.org/2001/XMLSchema" xmlns:xs="http://www.w3.org/2001/XMLSchema" xmlns:p="http://schemas.microsoft.com/office/2006/metadata/properties" xmlns:ns1="http://schemas.microsoft.com/sharepoint/v3" xmlns:ns2="71af3243-3dd4-4a8d-8c0d-dd76da1f02a5" xmlns:ns3="16c05727-aa75-4e4a-9b5f-8a80a1165891" xmlns:ns4="230e9df3-be65-4c73-a93b-d1236ebd677e" targetNamespace="http://schemas.microsoft.com/office/2006/metadata/properties" ma:root="true" ma:fieldsID="395891a93df65b14727750f2c06c306c" ns1:_="" ns2:_="" ns3:_="" ns4:_="">
     <xsd:import namespace="http://schemas.microsoft.com/sharepoint/v3"/>
@@ -21354,6 +21208,15 @@
 </ct:contentTypeSchema>
 </file>
 
+<file path=customXml/item2.xml><?xml version="1.0" encoding="utf-8"?>
+<?mso-contentType ?>
+<FormTemplates xmlns="http://schemas.microsoft.com/sharepoint/v3/contenttype/forms">
+  <Display>DocumentLibraryForm</Display>
+  <Edit>DocumentLibraryForm</Edit>
+  <New>DocumentLibraryForm</New>
+</FormTemplates>
+</file>
+
 <file path=customXml/item3.xml><?xml version="1.0" encoding="utf-8"?>
 <p:properties xmlns:p="http://schemas.microsoft.com/office/2006/metadata/properties" xmlns:xsi="http://www.w3.org/2001/XMLSchema-instance" xmlns:pc="http://schemas.microsoft.com/office/infopath/2007/PartnerControls">
   <documentManagement>
@@ -21374,14 +21237,6 @@
 </file>
 
 <file path=customXml/itemProps1.xml><?xml version="1.0" encoding="utf-8"?>
-<ds:datastoreItem xmlns:ds="http://schemas.openxmlformats.org/officeDocument/2006/customXml" ds:itemID="{42BC90D6-94CF-42F7-AAC4-9CF6824C54D5}">
-  <ds:schemaRefs>
-    <ds:schemaRef ds:uri="http://schemas.microsoft.com/sharepoint/v3/contenttype/forms"/>
-  </ds:schemaRefs>
-</ds:datastoreItem>
-</file>
-
-<file path=customXml/itemProps2.xml><?xml version="1.0" encoding="utf-8"?>
 <ds:datastoreItem xmlns:ds="http://schemas.openxmlformats.org/officeDocument/2006/customXml" ds:itemID="{64CF2EF3-001F-4BE9-81B3-86ECBBF9425F}">
   <ds:schemaRefs>
     <ds:schemaRef ds:uri="http://schemas.microsoft.com/office/2006/metadata/contentType"/>
@@ -21398,6 +21253,14 @@
     <ds:schemaRef ds:uri="http://purl.org/dc/elements/1.1/"/>
     <ds:schemaRef ds:uri="http://purl.org/dc/terms/"/>
     <ds:schemaRef ds:uri="http://schemas.microsoft.com/internal/obd"/>
+  </ds:schemaRefs>
+</ds:datastoreItem>
+</file>
+
+<file path=customXml/itemProps2.xml><?xml version="1.0" encoding="utf-8"?>
+<ds:datastoreItem xmlns:ds="http://schemas.openxmlformats.org/officeDocument/2006/customXml" ds:itemID="{42BC90D6-94CF-42F7-AAC4-9CF6824C54D5}">
+  <ds:schemaRefs>
+    <ds:schemaRef ds:uri="http://schemas.microsoft.com/sharepoint/v3/contenttype/forms"/>
   </ds:schemaRefs>
 </ds:datastoreItem>
 </file>

</xml_diff>